<commit_message>
Added I2C u-boot page
</commit_message>
<xml_diff>
--- a/content/DSP/cic_filters/20181014_CIC_Filters_JGIBBARD.pptx
+++ b/content/DSP/cic_filters/20181014_CIC_Filters_JGIBBARD.pptx
@@ -1333,7 +1333,7 @@
           <a:p>
             <a:fld id="{A87F09E2-AA5C-45AC-88B0-209839B47A04}" type="datetimeFigureOut">
               <a:rPr lang="en-GB" smtClean="0"/>
-              <a:t>14/10/2018</a:t>
+              <a:t>05/02/2022</a:t>
             </a:fld>
             <a:endParaRPr lang="en-GB" dirty="0"/>
           </a:p>
@@ -3324,7 +3324,7 @@
             <a:fld id="{87DE6118-2437-4B30-8E3C-4D2BE6020583}" type="datetimeFigureOut">
               <a:rPr lang="en-US" dirty="0"/>
               <a:pPr/>
-              <a:t>10/14/2018</a:t>
+              <a:t>2/5/2022</a:t>
             </a:fld>
             <a:endParaRPr lang="en-US" dirty="0"/>
           </a:p>
@@ -3650,7 +3650,7 @@
           <a:p>
             <a:fld id="{87DE6118-2437-4B30-8E3C-4D2BE6020583}" type="datetimeFigureOut">
               <a:rPr lang="en-US" dirty="0"/>
-              <a:t>10/14/2018</a:t>
+              <a:t>2/5/2022</a:t>
             </a:fld>
             <a:endParaRPr lang="en-US" dirty="0"/>
           </a:p>
@@ -3825,7 +3825,7 @@
           <a:p>
             <a:fld id="{87DE6118-2437-4B30-8E3C-4D2BE6020583}" type="datetimeFigureOut">
               <a:rPr lang="en-US" dirty="0"/>
-              <a:t>10/14/2018</a:t>
+              <a:t>2/5/2022</a:t>
             </a:fld>
             <a:endParaRPr lang="en-US" dirty="0"/>
           </a:p>
@@ -3990,7 +3990,7 @@
           <a:p>
             <a:fld id="{87DE6118-2437-4B30-8E3C-4D2BE6020583}" type="datetimeFigureOut">
               <a:rPr lang="en-US" dirty="0"/>
-              <a:t>10/14/2018</a:t>
+              <a:t>2/5/2022</a:t>
             </a:fld>
             <a:endParaRPr lang="en-US" dirty="0"/>
           </a:p>
@@ -4263,7 +4263,7 @@
             <a:fld id="{87DE6118-2437-4B30-8E3C-4D2BE6020583}" type="datetimeFigureOut">
               <a:rPr lang="en-US" dirty="0"/>
               <a:pPr/>
-              <a:t>10/14/2018</a:t>
+              <a:t>2/5/2022</a:t>
             </a:fld>
             <a:endParaRPr lang="en-US" dirty="0"/>
           </a:p>
@@ -4653,7 +4653,7 @@
           <a:p>
             <a:fld id="{87DE6118-2437-4B30-8E3C-4D2BE6020583}" type="datetimeFigureOut">
               <a:rPr lang="en-US" dirty="0"/>
-              <a:t>10/14/2018</a:t>
+              <a:t>2/5/2022</a:t>
             </a:fld>
             <a:endParaRPr lang="en-US" dirty="0"/>
           </a:p>
@@ -5125,7 +5125,7 @@
           <a:p>
             <a:fld id="{87DE6118-2437-4B30-8E3C-4D2BE6020583}" type="datetimeFigureOut">
               <a:rPr lang="en-US" dirty="0"/>
-              <a:t>10/14/2018</a:t>
+              <a:t>2/5/2022</a:t>
             </a:fld>
             <a:endParaRPr lang="en-US" dirty="0"/>
           </a:p>
@@ -5238,7 +5238,7 @@
           <a:p>
             <a:fld id="{87DE6118-2437-4B30-8E3C-4D2BE6020583}" type="datetimeFigureOut">
               <a:rPr lang="en-US" dirty="0"/>
-              <a:t>10/14/2018</a:t>
+              <a:t>2/5/2022</a:t>
             </a:fld>
             <a:endParaRPr lang="en-US" dirty="0"/>
           </a:p>
@@ -5328,7 +5328,7 @@
           <a:p>
             <a:fld id="{87DE6118-2437-4B30-8E3C-4D2BE6020583}" type="datetimeFigureOut">
               <a:rPr lang="en-US" dirty="0"/>
-              <a:t>10/14/2018</a:t>
+              <a:t>2/5/2022</a:t>
             </a:fld>
             <a:endParaRPr lang="en-US" dirty="0"/>
           </a:p>
@@ -5670,7 +5670,7 @@
             <a:fld id="{87DE6118-2437-4B30-8E3C-4D2BE6020583}" type="datetimeFigureOut">
               <a:rPr lang="en-US" dirty="0"/>
               <a:pPr/>
-              <a:t>10/14/2018</a:t>
+              <a:t>2/5/2022</a:t>
             </a:fld>
             <a:endParaRPr lang="en-US" dirty="0"/>
           </a:p>
@@ -6054,7 +6054,7 @@
             <a:fld id="{87DE6118-2437-4B30-8E3C-4D2BE6020583}" type="datetimeFigureOut">
               <a:rPr lang="en-US" dirty="0"/>
               <a:pPr/>
-              <a:t>10/14/2018</a:t>
+              <a:t>2/5/2022</a:t>
             </a:fld>
             <a:endParaRPr lang="en-US" dirty="0"/>
           </a:p>
@@ -6329,7 +6329,7 @@
             <a:fld id="{87DE6118-2437-4B30-8E3C-4D2BE6020583}" type="datetimeFigureOut">
               <a:rPr lang="en-US" dirty="0"/>
               <a:pPr/>
-              <a:t>10/14/2018</a:t>
+              <a:t>2/5/2022</a:t>
             </a:fld>
             <a:endParaRPr lang="en-US" dirty="0"/>
           </a:p>
@@ -6771,7 +6771,7 @@
       </a:lvl9pPr>
     </p:otherStyle>
   </p:txStyles>
-  <p:extLst mod="1">
+  <p:extLst>
     <p:ext uri="{27BBF7A9-308A-43DC-89C8-2F10F3537804}">
       <p15:sldGuideLst xmlns:p15="http://schemas.microsoft.com/office/powerpoint/2012/main">
         <p15:guide id="3" orient="horz" pos="1368">
@@ -7183,8 +7183,8 @@
           </a:p>
         </p:txBody>
       </p:sp>
-      <mc:AlternateContent xmlns:mc="http://schemas.openxmlformats.org/markup-compatibility/2006" xmlns:a14="http://schemas.microsoft.com/office/drawing/2010/main">
-        <mc:Choice Requires="a14">
+      <mc:AlternateContent xmlns:mc="http://schemas.openxmlformats.org/markup-compatibility/2006">
+        <mc:Choice xmlns:a14="http://schemas.microsoft.com/office/drawing/2010/main" Requires="a14">
           <p:sp>
             <p:nvSpPr>
               <p:cNvPr id="4" name="Content Placeholder 3">
@@ -7614,6 +7614,31 @@
                               </m:d>
                             </m:num>
                             <m:den>
+                              <m:sSub>
+                                <m:sSubPr>
+                                  <m:ctrlPr>
+                                    <a:rPr lang="en-GB" i="1">
+                                      <a:latin typeface="Cambria Math" panose="02040503050406030204" pitchFamily="18" charset="0"/>
+                                    </a:rPr>
+                                  </m:ctrlPr>
+                                </m:sSubPr>
+                                <m:e>
+                                  <m:r>
+                                    <a:rPr lang="en-GB" i="1">
+                                      <a:latin typeface="Cambria Math" panose="02040503050406030204" pitchFamily="18" charset="0"/>
+                                    </a:rPr>
+                                    <m:t>𝑙𝑜𝑔</m:t>
+                                  </m:r>
+                                </m:e>
+                                <m:sub>
+                                  <m:r>
+                                    <a:rPr lang="en-GB" i="1">
+                                      <a:latin typeface="Cambria Math" panose="02040503050406030204" pitchFamily="18" charset="0"/>
+                                    </a:rPr>
+                                    <m:t>2</m:t>
+                                  </m:r>
+                                </m:sub>
+                              </m:sSub>
                               <m:r>
                                 <a:rPr lang="en-GB" b="0" i="1" smtClean="0">
                                   <a:latin typeface="Cambria Math" panose="02040503050406030204" pitchFamily="18" charset="0"/>
@@ -7662,7 +7687,7 @@
             </p:txBody>
           </p:sp>
         </mc:Choice>
-        <mc:Fallback xmlns="">
+        <mc:Fallback>
           <p:sp>
             <p:nvSpPr>
               <p:cNvPr id="4" name="Content Placeholder 3">
@@ -7687,7 +7712,7 @@
               <a:blipFill>
                 <a:blip r:embed="rId3"/>
                 <a:stretch>
-                  <a:fillRect l="-2606" t="-2774" b="-438"/>
+                  <a:fillRect l="-2606" t="-2774"/>
                 </a:stretch>
               </a:blipFill>
             </p:spPr>

</xml_diff>